<commit_message>
Weitere Ausarbeitung der Präsentation
</commit_message>
<xml_diff>
--- a/Praesentation/Geograph 2017.pptx
+++ b/Praesentation/Geograph 2017.pptx
@@ -124,7 +124,16 @@
       </a:defRPr>
     </a:lvl9pPr>
   </p:defaultTextStyle>
+  <p:extLst>
+    <p:ext uri="{EFAFB233-063F-42B5-8137-9DF3F51BA10A}">
+      <p15:sldGuideLst xmlns:p15="http://schemas.microsoft.com/office/powerpoint/2012/main"/>
+    </p:ext>
+  </p:extLst>
 </p:presentation>
+</file>
+
+<file path=ppt/revisionInfo.xml><?xml version="1.0" encoding="utf-8"?>
+<p1510:revInfo xmlns:a="http://schemas.openxmlformats.org/drawingml/2006/main" xmlns:r="http://schemas.openxmlformats.org/officeDocument/2006/relationships" xmlns:p1510="http://schemas.microsoft.com/office/powerpoint/2015/10/main"/>
 </file>
 
 <file path=ppt/notesMasters/notesMaster1.xml><?xml version="1.0" encoding="utf-8"?>
@@ -209,7 +218,7 @@
           <a:p>
             <a:fld id="{616835FC-1EDB-4338-A12C-D7B00BB9767E}" type="datetimeFigureOut">
               <a:rPr lang="de-DE" smtClean="0"/>
-              <a:t>11.07.2017</a:t>
+              <a:t>13.07.2017</a:t>
             </a:fld>
             <a:endParaRPr lang="de-DE"/>
           </a:p>
@@ -304,7 +313,6 @@
               <a:rPr lang="de-DE"/>
               <a:t>Fünfte Ebene</a:t>
             </a:r>
-            <a:endParaRPr lang="de-DE"/>
           </a:p>
         </p:txBody>
       </p:sp>
@@ -1420,7 +1428,7 @@
           <a:p>
             <a:fld id="{4912CF34-7E51-4FD5-87FA-AFF60C6E14E8}" type="datetimeFigureOut">
               <a:rPr lang="de-DE" smtClean="0"/>
-              <a:t>11.07.2017</a:t>
+              <a:t>13.07.2017</a:t>
             </a:fld>
             <a:endParaRPr lang="de-DE"/>
           </a:p>
@@ -1716,7 +1724,7 @@
           <a:p>
             <a:fld id="{4912CF34-7E51-4FD5-87FA-AFF60C6E14E8}" type="datetimeFigureOut">
               <a:rPr lang="de-DE" smtClean="0"/>
-              <a:t>11.07.2017</a:t>
+              <a:t>13.07.2017</a:t>
             </a:fld>
             <a:endParaRPr lang="de-DE"/>
           </a:p>
@@ -1964,7 +1972,7 @@
           <a:p>
             <a:fld id="{4912CF34-7E51-4FD5-87FA-AFF60C6E14E8}" type="datetimeFigureOut">
               <a:rPr lang="de-DE" smtClean="0"/>
-              <a:t>11.07.2017</a:t>
+              <a:t>13.07.2017</a:t>
             </a:fld>
             <a:endParaRPr lang="de-DE"/>
           </a:p>
@@ -2504,7 +2512,7 @@
           <a:p>
             <a:fld id="{4912CF34-7E51-4FD5-87FA-AFF60C6E14E8}" type="datetimeFigureOut">
               <a:rPr lang="de-DE" smtClean="0"/>
-              <a:t>11.07.2017</a:t>
+              <a:t>13.07.2017</a:t>
             </a:fld>
             <a:endParaRPr lang="de-DE"/>
           </a:p>
@@ -2752,7 +2760,7 @@
           <a:p>
             <a:fld id="{4912CF34-7E51-4FD5-87FA-AFF60C6E14E8}" type="datetimeFigureOut">
               <a:rPr lang="de-DE" smtClean="0"/>
-              <a:t>11.07.2017</a:t>
+              <a:t>13.07.2017</a:t>
             </a:fld>
             <a:endParaRPr lang="de-DE"/>
           </a:p>
@@ -3284,7 +3292,7 @@
           <a:p>
             <a:fld id="{4912CF34-7E51-4FD5-87FA-AFF60C6E14E8}" type="datetimeFigureOut">
               <a:rPr lang="de-DE" smtClean="0"/>
-              <a:t>11.07.2017</a:t>
+              <a:t>13.07.2017</a:t>
             </a:fld>
             <a:endParaRPr lang="de-DE"/>
           </a:p>
@@ -3581,7 +3589,7 @@
           <a:p>
             <a:fld id="{4912CF34-7E51-4FD5-87FA-AFF60C6E14E8}" type="datetimeFigureOut">
               <a:rPr lang="de-DE" smtClean="0"/>
-              <a:t>11.07.2017</a:t>
+              <a:t>13.07.2017</a:t>
             </a:fld>
             <a:endParaRPr lang="de-DE"/>
           </a:p>
@@ -3755,7 +3763,7 @@
           <a:p>
             <a:fld id="{4912CF34-7E51-4FD5-87FA-AFF60C6E14E8}" type="datetimeFigureOut">
               <a:rPr lang="de-DE" smtClean="0"/>
-              <a:t>11.07.2017</a:t>
+              <a:t>13.07.2017</a:t>
             </a:fld>
             <a:endParaRPr lang="de-DE"/>
           </a:p>
@@ -3935,7 +3943,7 @@
           <a:p>
             <a:fld id="{4912CF34-7E51-4FD5-87FA-AFF60C6E14E8}" type="datetimeFigureOut">
               <a:rPr lang="de-DE" smtClean="0"/>
-              <a:t>11.07.2017</a:t>
+              <a:t>13.07.2017</a:t>
             </a:fld>
             <a:endParaRPr lang="de-DE"/>
           </a:p>
@@ -4146,7 +4154,7 @@
           <a:p>
             <a:fld id="{4912CF34-7E51-4FD5-87FA-AFF60C6E14E8}" type="datetimeFigureOut">
               <a:rPr lang="de-DE" smtClean="0"/>
-              <a:t>11.07.2017</a:t>
+              <a:t>13.07.2017</a:t>
             </a:fld>
             <a:endParaRPr lang="de-DE"/>
           </a:p>
@@ -4397,7 +4405,7 @@
           <a:p>
             <a:fld id="{4912CF34-7E51-4FD5-87FA-AFF60C6E14E8}" type="datetimeFigureOut">
               <a:rPr lang="de-DE" smtClean="0"/>
-              <a:t>11.07.2017</a:t>
+              <a:t>13.07.2017</a:t>
             </a:fld>
             <a:endParaRPr lang="de-DE"/>
           </a:p>
@@ -4744,7 +4752,7 @@
           <a:p>
             <a:fld id="{4912CF34-7E51-4FD5-87FA-AFF60C6E14E8}" type="datetimeFigureOut">
               <a:rPr lang="de-DE" smtClean="0"/>
-              <a:t>11.07.2017</a:t>
+              <a:t>13.07.2017</a:t>
             </a:fld>
             <a:endParaRPr lang="de-DE"/>
           </a:p>
@@ -5236,7 +5244,7 @@
           <a:p>
             <a:fld id="{4912CF34-7E51-4FD5-87FA-AFF60C6E14E8}" type="datetimeFigureOut">
               <a:rPr lang="de-DE" smtClean="0"/>
-              <a:t>11.07.2017</a:t>
+              <a:t>13.07.2017</a:t>
             </a:fld>
             <a:endParaRPr lang="de-DE"/>
           </a:p>
@@ -5354,7 +5362,7 @@
           <a:p>
             <a:fld id="{4912CF34-7E51-4FD5-87FA-AFF60C6E14E8}" type="datetimeFigureOut">
               <a:rPr lang="de-DE" smtClean="0"/>
-              <a:t>11.07.2017</a:t>
+              <a:t>13.07.2017</a:t>
             </a:fld>
             <a:endParaRPr lang="de-DE"/>
           </a:p>
@@ -5449,7 +5457,7 @@
           <a:p>
             <a:fld id="{4912CF34-7E51-4FD5-87FA-AFF60C6E14E8}" type="datetimeFigureOut">
               <a:rPr lang="de-DE" smtClean="0"/>
-              <a:t>11.07.2017</a:t>
+              <a:t>13.07.2017</a:t>
             </a:fld>
             <a:endParaRPr lang="de-DE"/>
           </a:p>
@@ -5732,7 +5740,7 @@
           <a:p>
             <a:fld id="{4912CF34-7E51-4FD5-87FA-AFF60C6E14E8}" type="datetimeFigureOut">
               <a:rPr lang="de-DE" smtClean="0"/>
-              <a:t>11.07.2017</a:t>
+              <a:t>13.07.2017</a:t>
             </a:fld>
             <a:endParaRPr lang="de-DE"/>
           </a:p>
@@ -6023,7 +6031,7 @@
           <a:p>
             <a:fld id="{4912CF34-7E51-4FD5-87FA-AFF60C6E14E8}" type="datetimeFigureOut">
               <a:rPr lang="de-DE" smtClean="0"/>
-              <a:t>11.07.2017</a:t>
+              <a:t>13.07.2017</a:t>
             </a:fld>
             <a:endParaRPr lang="de-DE"/>
           </a:p>
@@ -6553,7 +6561,7 @@
           <a:p>
             <a:fld id="{4912CF34-7E51-4FD5-87FA-AFF60C6E14E8}" type="datetimeFigureOut">
               <a:rPr lang="de-DE" smtClean="0"/>
-              <a:t>11.07.2017</a:t>
+              <a:t>13.07.2017</a:t>
             </a:fld>
             <a:endParaRPr lang="de-DE"/>
           </a:p>
@@ -7231,7 +7239,9 @@
         </p:nvSpPr>
         <p:spPr/>
         <p:txBody>
-          <a:bodyPr/>
+          <a:bodyPr>
+            <a:normAutofit lnSpcReduction="10000"/>
+          </a:bodyPr>
           <a:lstStyle/>
           <a:p>
             <a:r>
@@ -7241,12 +7251,56 @@
           </a:p>
           <a:p>
             <a:pPr lvl="1"/>
+            <a:r>
+              <a:rPr lang="de-DE" b="1" i="1" dirty="0"/>
+              <a:t>Eingabe der Koordinaten über eine </a:t>
+            </a:r>
+            <a:r>
+              <a:rPr lang="de-DE" b="1" i="1" dirty="0" err="1"/>
+              <a:t>BoundingBox</a:t>
+            </a:r>
             <a:endParaRPr lang="de-DE" b="1" i="1" dirty="0"/>
+          </a:p>
+          <a:p>
+            <a:pPr lvl="1"/>
+            <a:r>
+              <a:rPr lang="de-DE" b="1" i="1" dirty="0"/>
+              <a:t>Daten per </a:t>
+            </a:r>
+            <a:r>
+              <a:rPr lang="de-DE" b="1" i="1" dirty="0" err="1"/>
+              <a:t>ContentHolder</a:t>
+            </a:r>
+            <a:r>
+              <a:rPr lang="de-DE" b="1" i="1" dirty="0"/>
+              <a:t> senden und empfangen</a:t>
+            </a:r>
+          </a:p>
+          <a:p>
+            <a:pPr lvl="1"/>
+            <a:r>
+              <a:rPr lang="de-DE" b="1" i="1" dirty="0"/>
+              <a:t>Zeichnen der Knoten und Wege auf Karten</a:t>
+            </a:r>
           </a:p>
           <a:p>
             <a:r>
               <a:rPr lang="de-DE" b="1" i="1" dirty="0"/>
               <a:t>Erweitertes Konzept:</a:t>
+            </a:r>
+          </a:p>
+          <a:p>
+            <a:pPr lvl="1"/>
+            <a:r>
+              <a:rPr lang="de-DE" b="1" i="1" dirty="0"/>
+              <a:t>Karteninformationen in Datei speichern und auslesen</a:t>
+            </a:r>
+          </a:p>
+          <a:p>
+            <a:pPr lvl="1"/>
+            <a:r>
+              <a:rPr lang="de-DE" b="1" i="1" dirty="0"/>
+              <a:t>Karten per Maus bewegen</a:t>
             </a:r>
           </a:p>
         </p:txBody>
@@ -7355,6 +7409,20 @@
           <a:bodyPr/>
           <a:lstStyle/>
           <a:p>
+            <a:r>
+              <a:rPr lang="de-DE" dirty="0"/>
+              <a:t>Implementierung mit </a:t>
+            </a:r>
+            <a:r>
+              <a:rPr lang="de-DE" dirty="0" err="1"/>
+              <a:t>JavaFX</a:t>
+            </a:r>
+            <a:endParaRPr lang="de-DE" dirty="0"/>
+          </a:p>
+          <a:p>
+            <a:pPr marL="0" indent="0">
+              <a:buNone/>
+            </a:pPr>
             <a:endParaRPr lang="de-DE" dirty="0"/>
           </a:p>
         </p:txBody>
@@ -7701,15 +7769,7 @@
             <a:pPr lvl="1"/>
             <a:r>
               <a:rPr lang="de-DE" b="1" i="1" dirty="0"/>
-              <a:t>Erweiterte GUI Tests </a:t>
-            </a:r>
-            <a:r>
-              <a:rPr lang="de-DE" b="1" i="1" dirty="0"/>
-              <a:t>mittels</a:t>
-            </a:r>
-            <a:r>
-              <a:rPr lang="de-DE" b="1" i="1" dirty="0"/>
-              <a:t> </a:t>
+              <a:t>Erweiterte GUI Tests mittels </a:t>
             </a:r>
             <a:r>
               <a:rPr lang="de-DE" b="1" i="1" dirty="0" err="1"/>
@@ -8344,8 +8404,8 @@
         </p:blipFill>
         <p:spPr>
           <a:xfrm>
-            <a:off x="4318774" y="634467"/>
-            <a:ext cx="1328338" cy="1712991"/>
+            <a:off x="4321898" y="638497"/>
+            <a:ext cx="1325213" cy="1708961"/>
           </a:xfrm>
           <a:prstGeom prst="rect">
             <a:avLst/>
@@ -8495,7 +8555,6 @@
               <a:rPr lang="de-DE" b="1" dirty="0"/>
               <a:t>Qualitätssicherung</a:t>
             </a:r>
-            <a:endParaRPr lang="de-DE" b="1" dirty="0"/>
           </a:p>
           <a:p>
             <a:r>
@@ -8532,7 +8591,6 @@
               <a:rPr lang="de-DE" b="1" dirty="0"/>
               <a:t>								Parser - Programmierer</a:t>
             </a:r>
-            <a:endParaRPr lang="de-DE" b="1" dirty="0"/>
           </a:p>
           <a:p>
             <a:r>
@@ -8616,8 +8674,8 @@
         </p:blipFill>
         <p:spPr>
           <a:xfrm>
-            <a:off x="1503400" y="655458"/>
-            <a:ext cx="1219061" cy="1692000"/>
+            <a:off x="1510385" y="638496"/>
+            <a:ext cx="1212076" cy="1708961"/>
           </a:xfrm>
           <a:prstGeom prst="rect">
             <a:avLst/>
@@ -8672,7 +8730,7 @@
           <p:nvPr/>
         </p:nvPicPr>
         <p:blipFill>
-          <a:blip r:embed="rId4">
+          <a:blip r:embed="rId5">
             <a:extLst>
               <a:ext uri="{28A0092B-C50C-407E-A947-70E740481C1C}">
                 <a14:useLocalDpi xmlns:a14="http://schemas.microsoft.com/office/drawing/2010/main" val="0"/>
@@ -8685,8 +8743,8 @@
         </p:blipFill>
         <p:spPr>
           <a:xfrm>
-            <a:off x="5703512" y="644962"/>
-            <a:ext cx="1219061" cy="1692000"/>
+            <a:off x="5749202" y="644962"/>
+            <a:ext cx="1127681" cy="1692000"/>
           </a:xfrm>
           <a:prstGeom prst="rect">
             <a:avLst/>
@@ -8720,8 +8778,8 @@
         </p:blipFill>
         <p:spPr>
           <a:xfrm>
-            <a:off x="6978973" y="644260"/>
-            <a:ext cx="1219061" cy="1692000"/>
+            <a:off x="6987040" y="655456"/>
+            <a:ext cx="1210994" cy="1680803"/>
           </a:xfrm>
           <a:prstGeom prst="rect">
             <a:avLst/>
@@ -8742,7 +8800,7 @@
           <p:nvPr/>
         </p:nvPicPr>
         <p:blipFill>
-          <a:blip r:embed="rId4">
+          <a:blip r:embed="rId6">
             <a:extLst>
               <a:ext uri="{28A0092B-C50C-407E-A947-70E740481C1C}">
                 <a14:useLocalDpi xmlns:a14="http://schemas.microsoft.com/office/drawing/2010/main" val="0"/>
@@ -8755,8 +8813,8 @@
         </p:blipFill>
         <p:spPr>
           <a:xfrm>
-            <a:off x="9515552" y="652969"/>
-            <a:ext cx="1219061" cy="1692000"/>
+            <a:off x="9492449" y="655457"/>
+            <a:ext cx="1245655" cy="1689511"/>
           </a:xfrm>
           <a:prstGeom prst="rect">
             <a:avLst/>
@@ -8777,7 +8835,7 @@
           <p:nvPr/>
         </p:nvPicPr>
         <p:blipFill>
-          <a:blip r:embed="rId4">
+          <a:blip r:embed="rId7">
             <a:extLst>
               <a:ext uri="{28A0092B-C50C-407E-A947-70E740481C1C}">
                 <a14:useLocalDpi xmlns:a14="http://schemas.microsoft.com/office/drawing/2010/main" val="0"/>
@@ -8789,9 +8847,9 @@
           </a:stretch>
         </p:blipFill>
         <p:spPr>
-          <a:xfrm>
-            <a:off x="10791013" y="634467"/>
-            <a:ext cx="1219061" cy="1692000"/>
+          <a:xfrm rot="5400000">
+            <a:off x="10581362" y="877411"/>
+            <a:ext cx="1677210" cy="1257908"/>
           </a:xfrm>
           <a:prstGeom prst="rect">
             <a:avLst/>
@@ -8812,7 +8870,7 @@
           <p:nvPr/>
         </p:nvPicPr>
         <p:blipFill>
-          <a:blip r:embed="rId5">
+          <a:blip r:embed="rId8">
             <a:extLst>
               <a:ext uri="{28A0092B-C50C-407E-A947-70E740481C1C}">
                 <a14:useLocalDpi xmlns:a14="http://schemas.microsoft.com/office/drawing/2010/main" val="0"/>
@@ -8825,8 +8883,8 @@
         </p:blipFill>
         <p:spPr>
           <a:xfrm>
-            <a:off x="2781082" y="645216"/>
-            <a:ext cx="1469818" cy="1692000"/>
+            <a:off x="2761010" y="644962"/>
+            <a:ext cx="1489889" cy="1692254"/>
           </a:xfrm>
           <a:prstGeom prst="rect">
             <a:avLst/>
@@ -9002,7 +9060,7 @@
           <p:nvPr/>
         </p:nvPicPr>
         <p:blipFill>
-          <a:blip r:embed="rId6">
+          <a:blip r:embed="rId9">
             <a:extLst>
               <a:ext uri="{28A0092B-C50C-407E-A947-70E740481C1C}">
                 <a14:useLocalDpi xmlns:a14="http://schemas.microsoft.com/office/drawing/2010/main" val="0"/>
@@ -9015,8 +9073,8 @@
         </p:blipFill>
         <p:spPr>
           <a:xfrm>
-            <a:off x="8238488" y="656910"/>
-            <a:ext cx="1220664" cy="1679350"/>
+            <a:off x="8237192" y="655127"/>
+            <a:ext cx="1221960" cy="1681133"/>
           </a:xfrm>
           <a:prstGeom prst="rect">
             <a:avLst/>
@@ -9646,7 +9704,7 @@
         <p:spPr/>
         <p:txBody>
           <a:bodyPr>
-            <a:normAutofit fontScale="92500"/>
+            <a:normAutofit/>
           </a:bodyPr>
           <a:lstStyle/>
           <a:p>
@@ -9659,12 +9717,6 @@
             <a:r>
               <a:rPr lang="de-DE" dirty="0"/>
               <a:t>Die Aufteilung in Teams hat sehr gut geklappt, dadurch hatte jeder seinen eigenen Bereich und es gab klare Ansprechpartner für die unterschiedlichen Programmpunkte </a:t>
-            </a:r>
-          </a:p>
-          <a:p>
-            <a:r>
-              <a:rPr lang="de-DE" dirty="0"/>
-              <a:t>Die Verständigung mit dem Kunden gestaltete sich an einigen Punkte schwierig</a:t>
             </a:r>
           </a:p>
           <a:p>
@@ -10034,7 +10086,6 @@
               <a:rPr lang="de-DE" i="1" dirty="0"/>
               <a:t> konsolidiert</a:t>
             </a:r>
-            <a:endParaRPr lang="de-DE" i="1" dirty="0"/>
           </a:p>
         </p:txBody>
       </p:sp>

</xml_diff>